<commit_message>
new Slides and Samples
</commit_message>
<xml_diff>
--- a/JSTrainingj.pptx
+++ b/JSTrainingj.pptx
@@ -5,7 +5,7 @@
     <p:sldMasterId id="2147483648" r:id="rId1"/>
   </p:sldMasterIdLst>
   <p:notesMasterIdLst>
-    <p:notesMasterId r:id="rId21"/>
+    <p:notesMasterId r:id="rId25"/>
   </p:notesMasterIdLst>
   <p:sldIdLst>
     <p:sldId id="256" r:id="rId2"/>
@@ -27,6 +27,10 @@
     <p:sldId id="272" r:id="rId18"/>
     <p:sldId id="274" r:id="rId19"/>
     <p:sldId id="275" r:id="rId20"/>
+    <p:sldId id="276" r:id="rId21"/>
+    <p:sldId id="277" r:id="rId22"/>
+    <p:sldId id="278" r:id="rId23"/>
+    <p:sldId id="279" r:id="rId24"/>
   </p:sldIdLst>
   <p:sldSz cx="12192000" cy="6858000"/>
   <p:notesSz cx="6858000" cy="9144000"/>
@@ -4809,6 +4813,374 @@
     <p:extLst>
       <p:ext uri="{BB962C8B-B14F-4D97-AF65-F5344CB8AC3E}">
         <p14:creationId xmlns:p14="http://schemas.microsoft.com/office/powerpoint/2010/main" val="58672742"/>
+      </p:ext>
+    </p:extLst>
+  </p:cSld>
+  <p:clrMapOvr>
+    <a:masterClrMapping/>
+  </p:clrMapOvr>
+</p:sld>
+</file>
+
+<file path=ppt/slides/slide20.xml><?xml version="1.0" encoding="utf-8"?>
+<p:sld xmlns:a="http://schemas.openxmlformats.org/drawingml/2006/main" xmlns:r="http://schemas.openxmlformats.org/officeDocument/2006/relationships" xmlns:p="http://schemas.openxmlformats.org/presentationml/2006/main">
+  <p:cSld>
+    <p:spTree>
+      <p:nvGrpSpPr>
+        <p:cNvPr id="1" name=""/>
+        <p:cNvGrpSpPr/>
+        <p:nvPr/>
+      </p:nvGrpSpPr>
+      <p:grpSpPr>
+        <a:xfrm>
+          <a:off x="0" y="0"/>
+          <a:ext cx="0" cy="0"/>
+          <a:chOff x="0" y="0"/>
+          <a:chExt cx="0" cy="0"/>
+        </a:xfrm>
+      </p:grpSpPr>
+      <p:sp>
+        <p:nvSpPr>
+          <p:cNvPr id="2" name="Title 1"/>
+          <p:cNvSpPr>
+            <a:spLocks noGrp="1"/>
+          </p:cNvSpPr>
+          <p:nvPr>
+            <p:ph type="title"/>
+          </p:nvPr>
+        </p:nvSpPr>
+        <p:spPr/>
+        <p:txBody>
+          <a:bodyPr/>
+          <a:lstStyle/>
+          <a:p>
+            <a:r>
+              <a:rPr lang="en-GB" dirty="0" smtClean="0"/>
+              <a:t>Exceptions</a:t>
+            </a:r>
+            <a:endParaRPr lang="en-GB" dirty="0"/>
+          </a:p>
+        </p:txBody>
+      </p:sp>
+      <p:sp>
+        <p:nvSpPr>
+          <p:cNvPr id="3" name="Content Placeholder 2"/>
+          <p:cNvSpPr>
+            <a:spLocks noGrp="1"/>
+          </p:cNvSpPr>
+          <p:nvPr>
+            <p:ph idx="1"/>
+          </p:nvPr>
+        </p:nvSpPr>
+        <p:spPr/>
+        <p:txBody>
+          <a:bodyPr/>
+          <a:lstStyle/>
+          <a:p>
+            <a:r>
+              <a:rPr lang="en-GB" dirty="0" smtClean="0"/>
+              <a:t>try{stuff}catch(err){</a:t>
+            </a:r>
+            <a:r>
+              <a:rPr lang="en-GB" dirty="0" err="1" smtClean="0"/>
+              <a:t>console.log</a:t>
+            </a:r>
+            <a:r>
+              <a:rPr lang="en-GB" dirty="0" smtClean="0"/>
+              <a:t>(err);}finally{do anyway}</a:t>
+            </a:r>
+            <a:endParaRPr lang="en-GB" dirty="0"/>
+          </a:p>
+        </p:txBody>
+      </p:sp>
+    </p:spTree>
+    <p:extLst>
+      <p:ext uri="{BB962C8B-B14F-4D97-AF65-F5344CB8AC3E}">
+        <p14:creationId xmlns:p14="http://schemas.microsoft.com/office/powerpoint/2010/main" val="1512234174"/>
+      </p:ext>
+    </p:extLst>
+  </p:cSld>
+  <p:clrMapOvr>
+    <a:masterClrMapping/>
+  </p:clrMapOvr>
+</p:sld>
+</file>
+
+<file path=ppt/slides/slide21.xml><?xml version="1.0" encoding="utf-8"?>
+<p:sld xmlns:a="http://schemas.openxmlformats.org/drawingml/2006/main" xmlns:r="http://schemas.openxmlformats.org/officeDocument/2006/relationships" xmlns:p="http://schemas.openxmlformats.org/presentationml/2006/main">
+  <p:cSld>
+    <p:spTree>
+      <p:nvGrpSpPr>
+        <p:cNvPr id="1" name=""/>
+        <p:cNvGrpSpPr/>
+        <p:nvPr/>
+      </p:nvGrpSpPr>
+      <p:grpSpPr>
+        <a:xfrm>
+          <a:off x="0" y="0"/>
+          <a:ext cx="0" cy="0"/>
+          <a:chOff x="0" y="0"/>
+          <a:chExt cx="0" cy="0"/>
+        </a:xfrm>
+      </p:grpSpPr>
+      <p:sp>
+        <p:nvSpPr>
+          <p:cNvPr id="2" name="Title 1"/>
+          <p:cNvSpPr>
+            <a:spLocks noGrp="1"/>
+          </p:cNvSpPr>
+          <p:nvPr>
+            <p:ph type="title"/>
+          </p:nvPr>
+        </p:nvSpPr>
+        <p:spPr/>
+        <p:txBody>
+          <a:bodyPr/>
+          <a:lstStyle/>
+          <a:p>
+            <a:r>
+              <a:rPr lang="en-GB" dirty="0" smtClean="0"/>
+              <a:t>Debugging</a:t>
+            </a:r>
+            <a:endParaRPr lang="en-GB" dirty="0"/>
+          </a:p>
+        </p:txBody>
+      </p:sp>
+      <p:sp>
+        <p:nvSpPr>
+          <p:cNvPr id="3" name="Content Placeholder 2"/>
+          <p:cNvSpPr>
+            <a:spLocks noGrp="1"/>
+          </p:cNvSpPr>
+          <p:nvPr>
+            <p:ph idx="1"/>
+          </p:nvPr>
+        </p:nvSpPr>
+        <p:spPr/>
+        <p:txBody>
+          <a:bodyPr/>
+          <a:lstStyle/>
+          <a:p>
+            <a:r>
+              <a:rPr lang="en-GB" dirty="0" err="1" smtClean="0"/>
+              <a:t>Console.log</a:t>
+            </a:r>
+            <a:r>
+              <a:rPr lang="en-GB" dirty="0" smtClean="0"/>
+              <a:t>() ;)</a:t>
+            </a:r>
+          </a:p>
+          <a:p>
+            <a:r>
+              <a:rPr lang="en-GB" dirty="0" smtClean="0"/>
+              <a:t>debugger; creates a </a:t>
+            </a:r>
+            <a:r>
+              <a:rPr lang="en-GB" dirty="0" err="1" smtClean="0"/>
+              <a:t>Breackpoint</a:t>
+            </a:r>
+            <a:endParaRPr lang="en-GB" dirty="0" smtClean="0"/>
+          </a:p>
+        </p:txBody>
+      </p:sp>
+    </p:spTree>
+    <p:extLst>
+      <p:ext uri="{BB962C8B-B14F-4D97-AF65-F5344CB8AC3E}">
+        <p14:creationId xmlns:p14="http://schemas.microsoft.com/office/powerpoint/2010/main" val="34123637"/>
+      </p:ext>
+    </p:extLst>
+  </p:cSld>
+  <p:clrMapOvr>
+    <a:masterClrMapping/>
+  </p:clrMapOvr>
+</p:sld>
+</file>
+
+<file path=ppt/slides/slide22.xml><?xml version="1.0" encoding="utf-8"?>
+<p:sld xmlns:a="http://schemas.openxmlformats.org/drawingml/2006/main" xmlns:r="http://schemas.openxmlformats.org/officeDocument/2006/relationships" xmlns:p="http://schemas.openxmlformats.org/presentationml/2006/main">
+  <p:cSld>
+    <p:spTree>
+      <p:nvGrpSpPr>
+        <p:cNvPr id="1" name=""/>
+        <p:cNvGrpSpPr/>
+        <p:nvPr/>
+      </p:nvGrpSpPr>
+      <p:grpSpPr>
+        <a:xfrm>
+          <a:off x="0" y="0"/>
+          <a:ext cx="0" cy="0"/>
+          <a:chOff x="0" y="0"/>
+          <a:chExt cx="0" cy="0"/>
+        </a:xfrm>
+      </p:grpSpPr>
+      <p:sp>
+        <p:nvSpPr>
+          <p:cNvPr id="2" name="Title 1"/>
+          <p:cNvSpPr>
+            <a:spLocks noGrp="1"/>
+          </p:cNvSpPr>
+          <p:nvPr>
+            <p:ph type="title"/>
+          </p:nvPr>
+        </p:nvSpPr>
+        <p:spPr/>
+        <p:txBody>
+          <a:bodyPr/>
+          <a:lstStyle/>
+          <a:p>
+            <a:r>
+              <a:rPr lang="en-GB" dirty="0" smtClean="0"/>
+              <a:t>Your Turn</a:t>
+            </a:r>
+            <a:endParaRPr lang="en-GB" dirty="0"/>
+          </a:p>
+        </p:txBody>
+      </p:sp>
+      <p:sp>
+        <p:nvSpPr>
+          <p:cNvPr id="3" name="Content Placeholder 2"/>
+          <p:cNvSpPr>
+            <a:spLocks noGrp="1"/>
+          </p:cNvSpPr>
+          <p:nvPr>
+            <p:ph idx="1"/>
+          </p:nvPr>
+        </p:nvSpPr>
+        <p:spPr/>
+        <p:txBody>
+          <a:bodyPr/>
+          <a:lstStyle/>
+          <a:p>
+            <a:r>
+              <a:rPr lang="en-GB" dirty="0" smtClean="0"/>
+              <a:t>Install Editor of your choice (VS </a:t>
+            </a:r>
+            <a:r>
+              <a:rPr lang="en-GB" smtClean="0"/>
+              <a:t>Code)</a:t>
+            </a:r>
+            <a:endParaRPr lang="en-GB" dirty="0" smtClean="0"/>
+          </a:p>
+          <a:p>
+            <a:r>
+              <a:rPr lang="en-GB" dirty="0" smtClean="0"/>
+              <a:t>Open </a:t>
+            </a:r>
+            <a:r>
+              <a:rPr lang="en-GB" dirty="0" smtClean="0">
+                <a:hlinkClick r:id="rId2"/>
+              </a:rPr>
+              <a:t>Code Academy</a:t>
+            </a:r>
+            <a:endParaRPr lang="en-GB" dirty="0" smtClean="0"/>
+          </a:p>
+          <a:p>
+            <a:r>
+              <a:rPr lang="en-GB" dirty="0" smtClean="0"/>
+              <a:t>Create Account and start with exercises</a:t>
+            </a:r>
+            <a:endParaRPr lang="en-GB" dirty="0"/>
+          </a:p>
+        </p:txBody>
+      </p:sp>
+    </p:spTree>
+    <p:extLst>
+      <p:ext uri="{BB962C8B-B14F-4D97-AF65-F5344CB8AC3E}">
+        <p14:creationId xmlns:p14="http://schemas.microsoft.com/office/powerpoint/2010/main" val="1783093731"/>
+      </p:ext>
+    </p:extLst>
+  </p:cSld>
+  <p:clrMapOvr>
+    <a:masterClrMapping/>
+  </p:clrMapOvr>
+</p:sld>
+</file>
+
+<file path=ppt/slides/slide23.xml><?xml version="1.0" encoding="utf-8"?>
+<p:sld xmlns:a="http://schemas.openxmlformats.org/drawingml/2006/main" xmlns:r="http://schemas.openxmlformats.org/officeDocument/2006/relationships" xmlns:p="http://schemas.openxmlformats.org/presentationml/2006/main">
+  <p:cSld>
+    <p:spTree>
+      <p:nvGrpSpPr>
+        <p:cNvPr id="1" name=""/>
+        <p:cNvGrpSpPr/>
+        <p:nvPr/>
+      </p:nvGrpSpPr>
+      <p:grpSpPr>
+        <a:xfrm>
+          <a:off x="0" y="0"/>
+          <a:ext cx="0" cy="0"/>
+          <a:chOff x="0" y="0"/>
+          <a:chExt cx="0" cy="0"/>
+        </a:xfrm>
+      </p:grpSpPr>
+      <p:sp>
+        <p:nvSpPr>
+          <p:cNvPr id="2" name="Title 1"/>
+          <p:cNvSpPr>
+            <a:spLocks noGrp="1"/>
+          </p:cNvSpPr>
+          <p:nvPr>
+            <p:ph type="title"/>
+          </p:nvPr>
+        </p:nvSpPr>
+        <p:spPr/>
+        <p:txBody>
+          <a:bodyPr/>
+          <a:lstStyle/>
+          <a:p>
+            <a:r>
+              <a:rPr lang="en-GB" dirty="0" smtClean="0"/>
+              <a:t>Your turn, again</a:t>
+            </a:r>
+            <a:endParaRPr lang="en-GB" dirty="0"/>
+          </a:p>
+        </p:txBody>
+      </p:sp>
+      <p:sp>
+        <p:nvSpPr>
+          <p:cNvPr id="3" name="Content Placeholder 2"/>
+          <p:cNvSpPr>
+            <a:spLocks noGrp="1"/>
+          </p:cNvSpPr>
+          <p:nvPr>
+            <p:ph idx="1"/>
+          </p:nvPr>
+        </p:nvSpPr>
+        <p:spPr/>
+        <p:txBody>
+          <a:bodyPr/>
+          <a:lstStyle/>
+          <a:p>
+            <a:r>
+              <a:rPr lang="en-GB" dirty="0" smtClean="0"/>
+              <a:t>Create </a:t>
+            </a:r>
+            <a:r>
+              <a:rPr lang="en-GB" dirty="0" err="1" smtClean="0"/>
+              <a:t>SlideShow</a:t>
+            </a:r>
+            <a:r>
+              <a:rPr lang="en-GB" dirty="0" smtClean="0"/>
+              <a:t> like </a:t>
+            </a:r>
+            <a:r>
+              <a:rPr lang="en-GB" dirty="0" smtClean="0">
+                <a:hlinkClick r:id="rId2"/>
+              </a:rPr>
+              <a:t>here</a:t>
+            </a:r>
+            <a:r>
+              <a:rPr lang="en-GB" dirty="0" smtClean="0"/>
+              <a:t> but with JavaScript</a:t>
+            </a:r>
+            <a:endParaRPr lang="en-GB" dirty="0"/>
+          </a:p>
+        </p:txBody>
+      </p:sp>
+    </p:spTree>
+    <p:extLst>
+      <p:ext uri="{BB962C8B-B14F-4D97-AF65-F5344CB8AC3E}">
+        <p14:creationId xmlns:p14="http://schemas.microsoft.com/office/powerpoint/2010/main" val="68433193"/>
       </p:ext>
     </p:extLst>
   </p:cSld>

</xml_diff>